<commit_message>
Daten, Fakten und AIMA Folien hinzugefügt
</commit_message>
<xml_diff>
--- a/8vance.pptx
+++ b/8vance.pptx
@@ -7,6 +7,9 @@
   <p:sldIdLst>
     <p:sldId id="256" r:id="rId2"/>
     <p:sldId id="257" r:id="rId3"/>
+    <p:sldId id="258" r:id="rId4"/>
+    <p:sldId id="260" r:id="rId5"/>
+    <p:sldId id="259" r:id="rId6"/>
   </p:sldIdLst>
   <p:sldSz cx="12192000" cy="6858000"/>
   <p:notesSz cx="6858000" cy="9144000"/>
@@ -105,7 +108,16 @@
       </a:defRPr>
     </a:lvl9pPr>
   </p:defaultTextStyle>
+  <p:extLst>
+    <p:ext uri="{EFAFB233-063F-42B5-8137-9DF3F51BA10A}">
+      <p15:sldGuideLst xmlns:p15="http://schemas.microsoft.com/office/powerpoint/2012/main"/>
+    </p:ext>
+  </p:extLst>
 </p:presentation>
+</file>
+
+<file path=ppt/revisionInfo.xml><?xml version="1.0" encoding="utf-8"?>
+<p1510:revInfo xmlns:a="http://schemas.openxmlformats.org/drawingml/2006/main" xmlns:r="http://schemas.openxmlformats.org/officeDocument/2006/relationships" xmlns:p1510="http://schemas.microsoft.com/office/powerpoint/2015/10/main"/>
 </file>
 
 <file path=ppt/slideLayouts/slideLayout1.xml><?xml version="1.0" encoding="utf-8"?>
@@ -3378,6 +3390,42 @@
           </a:p>
         </p:txBody>
       </p:sp>
+      <p:pic>
+        <p:nvPicPr>
+          <p:cNvPr id="5" name="Grafik 4">
+            <a:extLst>
+              <a:ext uri="{FF2B5EF4-FFF2-40B4-BE49-F238E27FC236}">
+                <a16:creationId xmlns:a16="http://schemas.microsoft.com/office/drawing/2014/main" id="{5441B949-4E3C-4E94-8420-FC02E6D8BA15}"/>
+              </a:ext>
+            </a:extLst>
+          </p:cNvPr>
+          <p:cNvPicPr>
+            <a:picLocks noChangeAspect="1"/>
+          </p:cNvPicPr>
+          <p:nvPr/>
+        </p:nvPicPr>
+        <p:blipFill>
+          <a:blip r:embed="rId2">
+            <a:extLst>
+              <a:ext uri="{28A0092B-C50C-407E-A947-70E740481C1C}">
+                <a14:useLocalDpi xmlns:a14="http://schemas.microsoft.com/office/drawing/2010/main" val="0"/>
+              </a:ext>
+            </a:extLst>
+          </a:blip>
+          <a:stretch>
+            <a:fillRect/>
+          </a:stretch>
+        </p:blipFill>
+        <p:spPr>
+          <a:xfrm>
+            <a:off x="9337040" y="228600"/>
+            <a:ext cx="2854960" cy="2854960"/>
+          </a:xfrm>
+          <a:prstGeom prst="rect">
+            <a:avLst/>
+          </a:prstGeom>
+        </p:spPr>
+      </p:pic>
     </p:spTree>
     <p:extLst>
       <p:ext uri="{BB962C8B-B14F-4D97-AF65-F5344CB8AC3E}">
@@ -3497,6 +3545,1047 @@
     <p:extLst>
       <p:ext uri="{BB962C8B-B14F-4D97-AF65-F5344CB8AC3E}">
         <p14:creationId xmlns:p14="http://schemas.microsoft.com/office/powerpoint/2010/main" val="1231511219"/>
+      </p:ext>
+    </p:extLst>
+  </p:cSld>
+  <p:clrMapOvr>
+    <a:masterClrMapping/>
+  </p:clrMapOvr>
+</p:sld>
+</file>
+
+<file path=ppt/slides/slide3.xml><?xml version="1.0" encoding="utf-8"?>
+<p:sld xmlns:a="http://schemas.openxmlformats.org/drawingml/2006/main" xmlns:r="http://schemas.openxmlformats.org/officeDocument/2006/relationships" xmlns:p="http://schemas.openxmlformats.org/presentationml/2006/main">
+  <p:cSld>
+    <p:spTree>
+      <p:nvGrpSpPr>
+        <p:cNvPr id="1" name=""/>
+        <p:cNvGrpSpPr/>
+        <p:nvPr/>
+      </p:nvGrpSpPr>
+      <p:grpSpPr>
+        <a:xfrm>
+          <a:off x="0" y="0"/>
+          <a:ext cx="0" cy="0"/>
+          <a:chOff x="0" y="0"/>
+          <a:chExt cx="0" cy="0"/>
+        </a:xfrm>
+      </p:grpSpPr>
+      <p:sp>
+        <p:nvSpPr>
+          <p:cNvPr id="2" name="Titel 1">
+            <a:extLst>
+              <a:ext uri="{FF2B5EF4-FFF2-40B4-BE49-F238E27FC236}">
+                <a16:creationId xmlns:a16="http://schemas.microsoft.com/office/drawing/2014/main" id="{24D8D968-9D2B-417F-9A67-7939B9F44659}"/>
+              </a:ext>
+            </a:extLst>
+          </p:cNvPr>
+          <p:cNvSpPr>
+            <a:spLocks noGrp="1"/>
+          </p:cNvSpPr>
+          <p:nvPr>
+            <p:ph type="title"/>
+          </p:nvPr>
+        </p:nvSpPr>
+        <p:spPr/>
+        <p:txBody>
+          <a:bodyPr/>
+          <a:lstStyle/>
+          <a:p>
+            <a:r>
+              <a:rPr lang="de-DE" dirty="0"/>
+              <a:t>Daten und Fakten</a:t>
+            </a:r>
+          </a:p>
+        </p:txBody>
+      </p:sp>
+      <p:sp>
+        <p:nvSpPr>
+          <p:cNvPr id="3" name="Inhaltsplatzhalter 2">
+            <a:extLst>
+              <a:ext uri="{FF2B5EF4-FFF2-40B4-BE49-F238E27FC236}">
+                <a16:creationId xmlns:a16="http://schemas.microsoft.com/office/drawing/2014/main" id="{9FDEE3E3-AC19-4801-A930-1C2FE0B5C5FB}"/>
+              </a:ext>
+            </a:extLst>
+          </p:cNvPr>
+          <p:cNvSpPr>
+            <a:spLocks noGrp="1"/>
+          </p:cNvSpPr>
+          <p:nvPr>
+            <p:ph idx="1"/>
+          </p:nvPr>
+        </p:nvSpPr>
+        <p:spPr/>
+        <p:txBody>
+          <a:bodyPr/>
+          <a:lstStyle/>
+          <a:p>
+            <a:r>
+              <a:rPr lang="de-DE" dirty="0"/>
+              <a:t>deutsch-niederländisches Startup</a:t>
+            </a:r>
+          </a:p>
+          <a:p>
+            <a:r>
+              <a:rPr lang="de-DE" dirty="0"/>
+              <a:t>Gegründet 2012</a:t>
+            </a:r>
+          </a:p>
+          <a:p>
+            <a:r>
+              <a:rPr lang="de-DE" dirty="0"/>
+              <a:t>Ansässig in den Niederlanden</a:t>
+            </a:r>
+          </a:p>
+          <a:p>
+            <a:r>
+              <a:rPr lang="de-DE" dirty="0"/>
+              <a:t>CEO: Han Stoffels</a:t>
+            </a:r>
+          </a:p>
+          <a:p>
+            <a:r>
+              <a:rPr lang="de-DE" dirty="0"/>
+              <a:t>Beschäftigte: 11 – 50</a:t>
+            </a:r>
+          </a:p>
+          <a:p>
+            <a:endParaRPr lang="de-DE" dirty="0"/>
+          </a:p>
+          <a:p>
+            <a:r>
+              <a:rPr lang="de-DE" dirty="0"/>
+              <a:t>Kerngeschäft: Personalvermittler</a:t>
+            </a:r>
+          </a:p>
+          <a:p>
+            <a:pPr marL="0" indent="0">
+              <a:buNone/>
+            </a:pPr>
+            <a:endParaRPr lang="de-DE" dirty="0"/>
+          </a:p>
+          <a:p>
+            <a:pPr marL="0" indent="0">
+              <a:buNone/>
+            </a:pPr>
+            <a:endParaRPr lang="de-DE" dirty="0"/>
+          </a:p>
+        </p:txBody>
+      </p:sp>
+    </p:spTree>
+    <p:extLst>
+      <p:ext uri="{BB962C8B-B14F-4D97-AF65-F5344CB8AC3E}">
+        <p14:creationId xmlns:p14="http://schemas.microsoft.com/office/powerpoint/2010/main" val="1020559392"/>
+      </p:ext>
+    </p:extLst>
+  </p:cSld>
+  <p:clrMapOvr>
+    <a:masterClrMapping/>
+  </p:clrMapOvr>
+</p:sld>
+</file>
+
+<file path=ppt/slides/slide4.xml><?xml version="1.0" encoding="utf-8"?>
+<p:sld xmlns:a="http://schemas.openxmlformats.org/drawingml/2006/main" xmlns:r="http://schemas.openxmlformats.org/officeDocument/2006/relationships" xmlns:p="http://schemas.openxmlformats.org/presentationml/2006/main">
+  <p:cSld>
+    <p:spTree>
+      <p:nvGrpSpPr>
+        <p:cNvPr id="1" name=""/>
+        <p:cNvGrpSpPr/>
+        <p:nvPr/>
+      </p:nvGrpSpPr>
+      <p:grpSpPr>
+        <a:xfrm>
+          <a:off x="0" y="0"/>
+          <a:ext cx="0" cy="0"/>
+          <a:chOff x="0" y="0"/>
+          <a:chExt cx="0" cy="0"/>
+        </a:xfrm>
+      </p:grpSpPr>
+      <p:sp>
+        <p:nvSpPr>
+          <p:cNvPr id="2" name="Titel 1">
+            <a:extLst>
+              <a:ext uri="{FF2B5EF4-FFF2-40B4-BE49-F238E27FC236}">
+                <a16:creationId xmlns:a16="http://schemas.microsoft.com/office/drawing/2014/main" id="{CFCD7B75-020C-4B05-97F7-F79EA9E1DDB3}"/>
+              </a:ext>
+            </a:extLst>
+          </p:cNvPr>
+          <p:cNvSpPr>
+            <a:spLocks noGrp="1"/>
+          </p:cNvSpPr>
+          <p:nvPr>
+            <p:ph type="title"/>
+          </p:nvPr>
+        </p:nvSpPr>
+        <p:spPr/>
+        <p:txBody>
+          <a:bodyPr/>
+          <a:lstStyle/>
+          <a:p>
+            <a:r>
+              <a:rPr lang="de-DE" dirty="0"/>
+              <a:t>Kern von 8vance</a:t>
+            </a:r>
+          </a:p>
+        </p:txBody>
+      </p:sp>
+      <p:sp>
+        <p:nvSpPr>
+          <p:cNvPr id="3" name="Inhaltsplatzhalter 2">
+            <a:extLst>
+              <a:ext uri="{FF2B5EF4-FFF2-40B4-BE49-F238E27FC236}">
+                <a16:creationId xmlns:a16="http://schemas.microsoft.com/office/drawing/2014/main" id="{57DACF81-782C-4E7E-B636-B4D4A4B47E42}"/>
+              </a:ext>
+            </a:extLst>
+          </p:cNvPr>
+          <p:cNvSpPr>
+            <a:spLocks noGrp="1"/>
+          </p:cNvSpPr>
+          <p:nvPr>
+            <p:ph idx="1"/>
+          </p:nvPr>
+        </p:nvSpPr>
+        <p:spPr/>
+        <p:txBody>
+          <a:bodyPr/>
+          <a:lstStyle/>
+          <a:p>
+            <a:r>
+              <a:rPr lang="de-DE" dirty="0"/>
+              <a:t>AIMA (</a:t>
+            </a:r>
+            <a:r>
+              <a:rPr lang="de-DE" dirty="0" err="1"/>
+              <a:t>Automatic</a:t>
+            </a:r>
+            <a:r>
+              <a:rPr lang="de-DE" dirty="0"/>
+              <a:t> Intelligent </a:t>
+            </a:r>
+            <a:r>
+              <a:rPr lang="de-DE" dirty="0" err="1"/>
+              <a:t>Matching</a:t>
+            </a:r>
+            <a:r>
+              <a:rPr lang="de-DE" dirty="0"/>
+              <a:t> Agent)</a:t>
+            </a:r>
+          </a:p>
+          <a:p>
+            <a:r>
+              <a:rPr lang="de-DE" dirty="0"/>
+              <a:t>Durchsucht das Internet nach passenden Kandidaten</a:t>
+            </a:r>
+          </a:p>
+          <a:p>
+            <a:r>
+              <a:rPr lang="de-DE" dirty="0"/>
+              <a:t>Verwendet Big Data und Künstliche Intelligenz</a:t>
+            </a:r>
+          </a:p>
+          <a:p>
+            <a:r>
+              <a:rPr lang="de-DE" dirty="0"/>
+              <a:t>Vergleicht auch Soft Skills</a:t>
+            </a:r>
+          </a:p>
+          <a:p>
+            <a:endParaRPr lang="de-DE" dirty="0"/>
+          </a:p>
+        </p:txBody>
+      </p:sp>
+    </p:spTree>
+    <p:extLst>
+      <p:ext uri="{BB962C8B-B14F-4D97-AF65-F5344CB8AC3E}">
+        <p14:creationId xmlns:p14="http://schemas.microsoft.com/office/powerpoint/2010/main" val="1082851739"/>
+      </p:ext>
+    </p:extLst>
+  </p:cSld>
+  <p:clrMapOvr>
+    <a:masterClrMapping/>
+  </p:clrMapOvr>
+</p:sld>
+</file>
+
+<file path=ppt/slides/slide5.xml><?xml version="1.0" encoding="utf-8"?>
+<p:sld xmlns:a="http://schemas.openxmlformats.org/drawingml/2006/main" xmlns:r="http://schemas.openxmlformats.org/officeDocument/2006/relationships" xmlns:p="http://schemas.openxmlformats.org/presentationml/2006/main">
+  <p:cSld>
+    <p:spTree>
+      <p:nvGrpSpPr>
+        <p:cNvPr id="1" name=""/>
+        <p:cNvGrpSpPr/>
+        <p:nvPr/>
+      </p:nvGrpSpPr>
+      <p:grpSpPr>
+        <a:xfrm>
+          <a:off x="0" y="0"/>
+          <a:ext cx="0" cy="0"/>
+          <a:chOff x="0" y="0"/>
+          <a:chExt cx="0" cy="0"/>
+        </a:xfrm>
+      </p:grpSpPr>
+      <p:sp>
+        <p:nvSpPr>
+          <p:cNvPr id="2" name="Titel 1">
+            <a:extLst>
+              <a:ext uri="{FF2B5EF4-FFF2-40B4-BE49-F238E27FC236}">
+                <a16:creationId xmlns:a16="http://schemas.microsoft.com/office/drawing/2014/main" id="{21179806-7702-43D5-96CC-0DC9F97398F6}"/>
+              </a:ext>
+            </a:extLst>
+          </p:cNvPr>
+          <p:cNvSpPr>
+            <a:spLocks noGrp="1"/>
+          </p:cNvSpPr>
+          <p:nvPr>
+            <p:ph type="title"/>
+          </p:nvPr>
+        </p:nvSpPr>
+        <p:spPr/>
+        <p:txBody>
+          <a:bodyPr/>
+          <a:lstStyle/>
+          <a:p>
+            <a:r>
+              <a:rPr lang="de-DE" dirty="0"/>
+              <a:t>Dienstleistungen</a:t>
+            </a:r>
+          </a:p>
+        </p:txBody>
+      </p:sp>
+      <p:sp>
+        <p:nvSpPr>
+          <p:cNvPr id="9" name="Rechteck 8">
+            <a:extLst>
+              <a:ext uri="{FF2B5EF4-FFF2-40B4-BE49-F238E27FC236}">
+                <a16:creationId xmlns:a16="http://schemas.microsoft.com/office/drawing/2014/main" id="{2BFDE923-F746-4DF6-8737-FD8D056D40F0}"/>
+              </a:ext>
+            </a:extLst>
+          </p:cNvPr>
+          <p:cNvSpPr/>
+          <p:nvPr/>
+        </p:nvSpPr>
+        <p:spPr>
+          <a:xfrm>
+            <a:off x="693019" y="2579571"/>
+            <a:ext cx="4504623" cy="3773103"/>
+          </a:xfrm>
+          <a:prstGeom prst="rect">
+            <a:avLst/>
+          </a:prstGeom>
+        </p:spPr>
+        <p:style>
+          <a:lnRef idx="2">
+            <a:schemeClr val="accent2">
+              <a:shade val="50000"/>
+            </a:schemeClr>
+          </a:lnRef>
+          <a:fillRef idx="1">
+            <a:schemeClr val="accent2"/>
+          </a:fillRef>
+          <a:effectRef idx="0">
+            <a:schemeClr val="accent2"/>
+          </a:effectRef>
+          <a:fontRef idx="minor">
+            <a:schemeClr val="lt1"/>
+          </a:fontRef>
+        </p:style>
+        <p:txBody>
+          <a:bodyPr numCol="1" rtlCol="0" anchor="b"/>
+          <a:lstStyle/>
+          <a:p>
+            <a:pPr algn="r"/>
+            <a:r>
+              <a:rPr lang="de-DE" dirty="0"/>
+              <a:t>Eigenes Unternehmen</a:t>
+            </a:r>
+          </a:p>
+        </p:txBody>
+      </p:sp>
+      <p:sp>
+        <p:nvSpPr>
+          <p:cNvPr id="3" name="Inhaltsplatzhalter 2">
+            <a:extLst>
+              <a:ext uri="{FF2B5EF4-FFF2-40B4-BE49-F238E27FC236}">
+                <a16:creationId xmlns:a16="http://schemas.microsoft.com/office/drawing/2014/main" id="{9D7F7C24-AA8A-4335-B733-7D5B93B1C1A2}"/>
+              </a:ext>
+            </a:extLst>
+          </p:cNvPr>
+          <p:cNvSpPr>
+            <a:spLocks noGrp="1"/>
+          </p:cNvSpPr>
+          <p:nvPr>
+            <p:ph idx="1"/>
+          </p:nvPr>
+        </p:nvSpPr>
+        <p:spPr>
+          <a:xfrm>
+            <a:off x="838200" y="1825625"/>
+            <a:ext cx="10278979" cy="503689"/>
+          </a:xfrm>
+        </p:spPr>
+        <p:txBody>
+          <a:bodyPr/>
+          <a:lstStyle/>
+          <a:p>
+            <a:r>
+              <a:rPr lang="de-DE" dirty="0"/>
+              <a:t>Lizenzgebühr für die Benutzung von AIMA</a:t>
+            </a:r>
+          </a:p>
+        </p:txBody>
+      </p:sp>
+      <p:sp>
+        <p:nvSpPr>
+          <p:cNvPr id="4" name="Rechteck: abgerundete Ecken 3">
+            <a:extLst>
+              <a:ext uri="{FF2B5EF4-FFF2-40B4-BE49-F238E27FC236}">
+                <a16:creationId xmlns:a16="http://schemas.microsoft.com/office/drawing/2014/main" id="{FFD4ADCD-38A3-47B8-98FC-81E638F99B3B}"/>
+              </a:ext>
+            </a:extLst>
+          </p:cNvPr>
+          <p:cNvSpPr/>
+          <p:nvPr/>
+        </p:nvSpPr>
+        <p:spPr>
+          <a:xfrm>
+            <a:off x="838200" y="3436218"/>
+            <a:ext cx="1828800" cy="1482291"/>
+          </a:xfrm>
+          <a:prstGeom prst="roundRect">
+            <a:avLst/>
+          </a:prstGeom>
+        </p:spPr>
+        <p:style>
+          <a:lnRef idx="2">
+            <a:schemeClr val="accent1">
+              <a:shade val="50000"/>
+            </a:schemeClr>
+          </a:lnRef>
+          <a:fillRef idx="1">
+            <a:schemeClr val="accent1"/>
+          </a:fillRef>
+          <a:effectRef idx="0">
+            <a:schemeClr val="accent1"/>
+          </a:effectRef>
+          <a:fontRef idx="minor">
+            <a:schemeClr val="lt1"/>
+          </a:fontRef>
+        </p:style>
+        <p:txBody>
+          <a:bodyPr rtlCol="0" anchor="ctr"/>
+          <a:lstStyle/>
+          <a:p>
+            <a:pPr algn="ctr"/>
+            <a:r>
+              <a:rPr lang="de-DE" dirty="0"/>
+              <a:t>Freie Stelle im Unternehmen</a:t>
+            </a:r>
+          </a:p>
+        </p:txBody>
+      </p:sp>
+      <p:sp>
+        <p:nvSpPr>
+          <p:cNvPr id="12" name="Rechteck 11">
+            <a:extLst>
+              <a:ext uri="{FF2B5EF4-FFF2-40B4-BE49-F238E27FC236}">
+                <a16:creationId xmlns:a16="http://schemas.microsoft.com/office/drawing/2014/main" id="{1B5B4D61-088E-4017-BDB4-A197E6EEDCBE}"/>
+              </a:ext>
+            </a:extLst>
+          </p:cNvPr>
+          <p:cNvSpPr/>
+          <p:nvPr/>
+        </p:nvSpPr>
+        <p:spPr>
+          <a:xfrm>
+            <a:off x="5197642" y="2579571"/>
+            <a:ext cx="5919537" cy="3773103"/>
+          </a:xfrm>
+          <a:prstGeom prst="rect">
+            <a:avLst/>
+          </a:prstGeom>
+        </p:spPr>
+        <p:style>
+          <a:lnRef idx="2">
+            <a:schemeClr val="accent6">
+              <a:shade val="50000"/>
+            </a:schemeClr>
+          </a:lnRef>
+          <a:fillRef idx="1">
+            <a:schemeClr val="accent6"/>
+          </a:fillRef>
+          <a:effectRef idx="0">
+            <a:schemeClr val="accent6"/>
+          </a:effectRef>
+          <a:fontRef idx="minor">
+            <a:schemeClr val="lt1"/>
+          </a:fontRef>
+        </p:style>
+        <p:txBody>
+          <a:bodyPr numCol="1" rtlCol="0" anchor="b"/>
+          <a:lstStyle/>
+          <a:p>
+            <a:pPr algn="r"/>
+            <a:r>
+              <a:rPr lang="de-DE" dirty="0"/>
+              <a:t>8vance</a:t>
+            </a:r>
+          </a:p>
+        </p:txBody>
+      </p:sp>
+      <p:sp>
+        <p:nvSpPr>
+          <p:cNvPr id="6" name="Rechteck: abgerundete Ecken 5">
+            <a:extLst>
+              <a:ext uri="{FF2B5EF4-FFF2-40B4-BE49-F238E27FC236}">
+                <a16:creationId xmlns:a16="http://schemas.microsoft.com/office/drawing/2014/main" id="{408902A2-837F-4636-944D-220BAB365EFA}"/>
+              </a:ext>
+            </a:extLst>
+          </p:cNvPr>
+          <p:cNvSpPr/>
+          <p:nvPr/>
+        </p:nvSpPr>
+        <p:spPr>
+          <a:xfrm>
+            <a:off x="4267200" y="3436218"/>
+            <a:ext cx="1828800" cy="1482291"/>
+          </a:xfrm>
+          <a:prstGeom prst="roundRect">
+            <a:avLst/>
+          </a:prstGeom>
+        </p:spPr>
+        <p:style>
+          <a:lnRef idx="2">
+            <a:schemeClr val="accent1">
+              <a:shade val="50000"/>
+            </a:schemeClr>
+          </a:lnRef>
+          <a:fillRef idx="1">
+            <a:schemeClr val="accent1"/>
+          </a:fillRef>
+          <a:effectRef idx="0">
+            <a:schemeClr val="accent1"/>
+          </a:effectRef>
+          <a:fontRef idx="minor">
+            <a:schemeClr val="lt1"/>
+          </a:fontRef>
+        </p:style>
+        <p:txBody>
+          <a:bodyPr rtlCol="0" anchor="ctr"/>
+          <a:lstStyle/>
+          <a:p>
+            <a:pPr algn="ctr"/>
+            <a:r>
+              <a:rPr lang="de-DE" dirty="0"/>
+              <a:t>AIMA</a:t>
+            </a:r>
+          </a:p>
+        </p:txBody>
+      </p:sp>
+      <p:cxnSp>
+        <p:nvCxnSpPr>
+          <p:cNvPr id="11" name="Gerade Verbindung mit Pfeil 10">
+            <a:extLst>
+              <a:ext uri="{FF2B5EF4-FFF2-40B4-BE49-F238E27FC236}">
+                <a16:creationId xmlns:a16="http://schemas.microsoft.com/office/drawing/2014/main" id="{4F88E6E7-6A76-421B-9158-0531D6B85D60}"/>
+              </a:ext>
+            </a:extLst>
+          </p:cNvPr>
+          <p:cNvCxnSpPr>
+            <a:cxnSpLocks/>
+          </p:cNvCxnSpPr>
+          <p:nvPr/>
+        </p:nvCxnSpPr>
+        <p:spPr>
+          <a:xfrm>
+            <a:off x="2667000" y="3755339"/>
+            <a:ext cx="1600200" cy="0"/>
+          </a:xfrm>
+          <a:prstGeom prst="straightConnector1">
+            <a:avLst/>
+          </a:prstGeom>
+          <a:ln w="57150">
+            <a:solidFill>
+              <a:schemeClr val="tx1"/>
+            </a:solidFill>
+            <a:tailEnd type="triangle"/>
+          </a:ln>
+        </p:spPr>
+        <p:style>
+          <a:lnRef idx="1">
+            <a:schemeClr val="accent1"/>
+          </a:lnRef>
+          <a:fillRef idx="0">
+            <a:schemeClr val="accent1"/>
+          </a:fillRef>
+          <a:effectRef idx="0">
+            <a:schemeClr val="accent1"/>
+          </a:effectRef>
+          <a:fontRef idx="minor">
+            <a:schemeClr val="tx1"/>
+          </a:fontRef>
+        </p:style>
+      </p:cxnSp>
+      <p:sp>
+        <p:nvSpPr>
+          <p:cNvPr id="13" name="Ellipse 12">
+            <a:extLst>
+              <a:ext uri="{FF2B5EF4-FFF2-40B4-BE49-F238E27FC236}">
+                <a16:creationId xmlns:a16="http://schemas.microsoft.com/office/drawing/2014/main" id="{1D1D473D-1839-4582-A76B-423EA06BA87F}"/>
+              </a:ext>
+            </a:extLst>
+          </p:cNvPr>
+          <p:cNvSpPr/>
+          <p:nvPr/>
+        </p:nvSpPr>
+        <p:spPr>
+          <a:xfrm>
+            <a:off x="7696200" y="2877954"/>
+            <a:ext cx="3089709" cy="2906829"/>
+          </a:xfrm>
+          <a:prstGeom prst="ellipse">
+            <a:avLst/>
+          </a:prstGeom>
+        </p:spPr>
+        <p:style>
+          <a:lnRef idx="2">
+            <a:schemeClr val="accent1">
+              <a:shade val="50000"/>
+            </a:schemeClr>
+          </a:lnRef>
+          <a:fillRef idx="1">
+            <a:schemeClr val="accent1"/>
+          </a:fillRef>
+          <a:effectRef idx="0">
+            <a:schemeClr val="accent1"/>
+          </a:effectRef>
+          <a:fontRef idx="minor">
+            <a:schemeClr val="lt1"/>
+          </a:fontRef>
+        </p:style>
+        <p:txBody>
+          <a:bodyPr rtlCol="0" anchor="b"/>
+          <a:lstStyle/>
+          <a:p>
+            <a:pPr algn="ctr"/>
+            <a:r>
+              <a:rPr lang="de-DE" dirty="0"/>
+              <a:t>Big Data | KI</a:t>
+            </a:r>
+          </a:p>
+        </p:txBody>
+      </p:sp>
+      <p:sp>
+        <p:nvSpPr>
+          <p:cNvPr id="14" name="Rechteck 13">
+            <a:extLst>
+              <a:ext uri="{FF2B5EF4-FFF2-40B4-BE49-F238E27FC236}">
+                <a16:creationId xmlns:a16="http://schemas.microsoft.com/office/drawing/2014/main" id="{76D9546A-02AE-49FA-93C8-7BEC3D31C0A8}"/>
+              </a:ext>
+            </a:extLst>
+          </p:cNvPr>
+          <p:cNvSpPr/>
+          <p:nvPr/>
+        </p:nvSpPr>
+        <p:spPr>
+          <a:xfrm>
+            <a:off x="8114898" y="4677878"/>
+            <a:ext cx="2252312" cy="240631"/>
+          </a:xfrm>
+          <a:prstGeom prst="rect">
+            <a:avLst/>
+          </a:prstGeom>
+        </p:spPr>
+        <p:style>
+          <a:lnRef idx="3">
+            <a:schemeClr val="lt1"/>
+          </a:lnRef>
+          <a:fillRef idx="1">
+            <a:schemeClr val="accent4"/>
+          </a:fillRef>
+          <a:effectRef idx="1">
+            <a:schemeClr val="accent4"/>
+          </a:effectRef>
+          <a:fontRef idx="minor">
+            <a:schemeClr val="lt1"/>
+          </a:fontRef>
+        </p:style>
+        <p:txBody>
+          <a:bodyPr rtlCol="0" anchor="ctr"/>
+          <a:lstStyle/>
+          <a:p>
+            <a:pPr algn="ctr"/>
+            <a:r>
+              <a:rPr lang="de-DE" dirty="0"/>
+              <a:t>Soziale Netzwerke</a:t>
+            </a:r>
+          </a:p>
+        </p:txBody>
+      </p:sp>
+      <p:sp>
+        <p:nvSpPr>
+          <p:cNvPr id="16" name="Rechteck 15">
+            <a:extLst>
+              <a:ext uri="{FF2B5EF4-FFF2-40B4-BE49-F238E27FC236}">
+                <a16:creationId xmlns:a16="http://schemas.microsoft.com/office/drawing/2014/main" id="{C21358A1-A311-4A33-A087-460A26E03707}"/>
+              </a:ext>
+            </a:extLst>
+          </p:cNvPr>
+          <p:cNvSpPr/>
+          <p:nvPr/>
+        </p:nvSpPr>
+        <p:spPr>
+          <a:xfrm>
+            <a:off x="8114898" y="4288055"/>
+            <a:ext cx="2252312" cy="240631"/>
+          </a:xfrm>
+          <a:prstGeom prst="rect">
+            <a:avLst/>
+          </a:prstGeom>
+        </p:spPr>
+        <p:style>
+          <a:lnRef idx="3">
+            <a:schemeClr val="lt1"/>
+          </a:lnRef>
+          <a:fillRef idx="1">
+            <a:schemeClr val="accent4"/>
+          </a:fillRef>
+          <a:effectRef idx="1">
+            <a:schemeClr val="accent4"/>
+          </a:effectRef>
+          <a:fontRef idx="minor">
+            <a:schemeClr val="lt1"/>
+          </a:fontRef>
+        </p:style>
+        <p:txBody>
+          <a:bodyPr rtlCol="0" anchor="ctr"/>
+          <a:lstStyle/>
+          <a:p>
+            <a:pPr algn="ctr"/>
+            <a:r>
+              <a:rPr lang="de-DE" dirty="0"/>
+              <a:t>Datenbanken</a:t>
+            </a:r>
+          </a:p>
+        </p:txBody>
+      </p:sp>
+      <p:sp>
+        <p:nvSpPr>
+          <p:cNvPr id="17" name="Rechteck 16">
+            <a:extLst>
+              <a:ext uri="{FF2B5EF4-FFF2-40B4-BE49-F238E27FC236}">
+                <a16:creationId xmlns:a16="http://schemas.microsoft.com/office/drawing/2014/main" id="{F26EA52A-19D9-47D2-A0E3-3881F9C0E0D4}"/>
+              </a:ext>
+            </a:extLst>
+          </p:cNvPr>
+          <p:cNvSpPr/>
+          <p:nvPr/>
+        </p:nvSpPr>
+        <p:spPr>
+          <a:xfrm>
+            <a:off x="7998593" y="3852513"/>
+            <a:ext cx="2476902" cy="257474"/>
+          </a:xfrm>
+          <a:prstGeom prst="rect">
+            <a:avLst/>
+          </a:prstGeom>
+        </p:spPr>
+        <p:style>
+          <a:lnRef idx="3">
+            <a:schemeClr val="lt1"/>
+          </a:lnRef>
+          <a:fillRef idx="1">
+            <a:schemeClr val="accent4"/>
+          </a:fillRef>
+          <a:effectRef idx="1">
+            <a:schemeClr val="accent4"/>
+          </a:effectRef>
+          <a:fontRef idx="minor">
+            <a:schemeClr val="lt1"/>
+          </a:fontRef>
+        </p:style>
+        <p:txBody>
+          <a:bodyPr rtlCol="0" anchor="ctr"/>
+          <a:lstStyle/>
+          <a:p>
+            <a:pPr algn="ctr"/>
+            <a:r>
+              <a:rPr lang="de-DE" dirty="0"/>
+              <a:t>öffentliche Lebensläufe</a:t>
+            </a:r>
+          </a:p>
+        </p:txBody>
+      </p:sp>
+      <p:cxnSp>
+        <p:nvCxnSpPr>
+          <p:cNvPr id="19" name="Gerade Verbindung mit Pfeil 18">
+            <a:extLst>
+              <a:ext uri="{FF2B5EF4-FFF2-40B4-BE49-F238E27FC236}">
+                <a16:creationId xmlns:a16="http://schemas.microsoft.com/office/drawing/2014/main" id="{64B1E2A3-FE7B-432F-A6B7-B5C3C33BBABB}"/>
+              </a:ext>
+            </a:extLst>
+          </p:cNvPr>
+          <p:cNvCxnSpPr/>
+          <p:nvPr/>
+        </p:nvCxnSpPr>
+        <p:spPr>
+          <a:xfrm>
+            <a:off x="6096000" y="3782728"/>
+            <a:ext cx="1710088" cy="0"/>
+          </a:xfrm>
+          <a:prstGeom prst="straightConnector1">
+            <a:avLst/>
+          </a:prstGeom>
+          <a:ln w="57150">
+            <a:solidFill>
+              <a:schemeClr val="tx1"/>
+            </a:solidFill>
+            <a:tailEnd type="triangle"/>
+          </a:ln>
+        </p:spPr>
+        <p:style>
+          <a:lnRef idx="1">
+            <a:schemeClr val="accent1"/>
+          </a:lnRef>
+          <a:fillRef idx="0">
+            <a:schemeClr val="accent1"/>
+          </a:fillRef>
+          <a:effectRef idx="0">
+            <a:schemeClr val="accent1"/>
+          </a:effectRef>
+          <a:fontRef idx="minor">
+            <a:schemeClr val="tx1"/>
+          </a:fontRef>
+        </p:style>
+      </p:cxnSp>
+      <p:cxnSp>
+        <p:nvCxnSpPr>
+          <p:cNvPr id="21" name="Gerade Verbindung mit Pfeil 20">
+            <a:extLst>
+              <a:ext uri="{FF2B5EF4-FFF2-40B4-BE49-F238E27FC236}">
+                <a16:creationId xmlns:a16="http://schemas.microsoft.com/office/drawing/2014/main" id="{F048CF99-9FBE-4563-BA3B-EBDA8E66A6FE}"/>
+              </a:ext>
+            </a:extLst>
+          </p:cNvPr>
+          <p:cNvCxnSpPr/>
+          <p:nvPr/>
+        </p:nvCxnSpPr>
+        <p:spPr>
+          <a:xfrm flipH="1">
+            <a:off x="6096000" y="4600876"/>
+            <a:ext cx="1600200" cy="0"/>
+          </a:xfrm>
+          <a:prstGeom prst="straightConnector1">
+            <a:avLst/>
+          </a:prstGeom>
+          <a:ln w="57150">
+            <a:solidFill>
+              <a:schemeClr val="tx1"/>
+            </a:solidFill>
+            <a:tailEnd type="triangle"/>
+          </a:ln>
+        </p:spPr>
+        <p:style>
+          <a:lnRef idx="1">
+            <a:schemeClr val="accent1"/>
+          </a:lnRef>
+          <a:fillRef idx="0">
+            <a:schemeClr val="accent1"/>
+          </a:fillRef>
+          <a:effectRef idx="0">
+            <a:schemeClr val="accent1"/>
+          </a:effectRef>
+          <a:fontRef idx="minor">
+            <a:schemeClr val="tx1"/>
+          </a:fontRef>
+        </p:style>
+      </p:cxnSp>
+      <p:sp>
+        <p:nvSpPr>
+          <p:cNvPr id="22" name="Textfeld 21">
+            <a:extLst>
+              <a:ext uri="{FF2B5EF4-FFF2-40B4-BE49-F238E27FC236}">
+                <a16:creationId xmlns:a16="http://schemas.microsoft.com/office/drawing/2014/main" id="{66D5821B-FE54-49F0-9D0A-1BA948D6B138}"/>
+              </a:ext>
+            </a:extLst>
+          </p:cNvPr>
+          <p:cNvSpPr txBox="1"/>
+          <p:nvPr/>
+        </p:nvSpPr>
+        <p:spPr>
+          <a:xfrm>
+            <a:off x="6270171" y="3436218"/>
+            <a:ext cx="1245996" cy="369332"/>
+          </a:xfrm>
+          <a:prstGeom prst="rect">
+            <a:avLst/>
+          </a:prstGeom>
+          <a:noFill/>
+        </p:spPr>
+        <p:txBody>
+          <a:bodyPr wrap="square" rtlCol="0">
+            <a:spAutoFit/>
+          </a:bodyPr>
+          <a:lstStyle/>
+          <a:p>
+            <a:r>
+              <a:rPr lang="de-DE" dirty="0"/>
+              <a:t>Vakanz</a:t>
+            </a:r>
+          </a:p>
+        </p:txBody>
+      </p:sp>
+      <p:sp>
+        <p:nvSpPr>
+          <p:cNvPr id="23" name="Textfeld 22">
+            <a:extLst>
+              <a:ext uri="{FF2B5EF4-FFF2-40B4-BE49-F238E27FC236}">
+                <a16:creationId xmlns:a16="http://schemas.microsoft.com/office/drawing/2014/main" id="{CA77C4E2-45D0-4BC6-A29B-F3F281FC00C0}"/>
+              </a:ext>
+            </a:extLst>
+          </p:cNvPr>
+          <p:cNvSpPr txBox="1"/>
+          <p:nvPr/>
+        </p:nvSpPr>
+        <p:spPr>
+          <a:xfrm>
+            <a:off x="6306613" y="4239756"/>
+            <a:ext cx="1245996" cy="369332"/>
+          </a:xfrm>
+          <a:prstGeom prst="rect">
+            <a:avLst/>
+          </a:prstGeom>
+          <a:noFill/>
+        </p:spPr>
+        <p:txBody>
+          <a:bodyPr wrap="square" rtlCol="0">
+            <a:spAutoFit/>
+          </a:bodyPr>
+          <a:lstStyle/>
+          <a:p>
+            <a:r>
+              <a:rPr lang="de-DE" dirty="0"/>
+              <a:t>Kandidat</a:t>
+            </a:r>
+          </a:p>
+        </p:txBody>
+      </p:sp>
+      <p:sp>
+        <p:nvSpPr>
+          <p:cNvPr id="24" name="Textfeld 23">
+            <a:extLst>
+              <a:ext uri="{FF2B5EF4-FFF2-40B4-BE49-F238E27FC236}">
+                <a16:creationId xmlns:a16="http://schemas.microsoft.com/office/drawing/2014/main" id="{D9BA236C-5B4B-472C-8924-AAE9A025B38E}"/>
+              </a:ext>
+            </a:extLst>
+          </p:cNvPr>
+          <p:cNvSpPr txBox="1"/>
+          <p:nvPr/>
+        </p:nvSpPr>
+        <p:spPr>
+          <a:xfrm>
+            <a:off x="2702367" y="3386007"/>
+            <a:ext cx="1245996" cy="369332"/>
+          </a:xfrm>
+          <a:prstGeom prst="rect">
+            <a:avLst/>
+          </a:prstGeom>
+          <a:noFill/>
+        </p:spPr>
+        <p:txBody>
+          <a:bodyPr wrap="square" rtlCol="0">
+            <a:spAutoFit/>
+          </a:bodyPr>
+          <a:lstStyle/>
+          <a:p>
+            <a:r>
+              <a:rPr lang="de-DE" dirty="0"/>
+              <a:t>Vakanz</a:t>
+            </a:r>
+          </a:p>
+        </p:txBody>
+      </p:sp>
+      <p:cxnSp>
+        <p:nvCxnSpPr>
+          <p:cNvPr id="25" name="Gerade Verbindung mit Pfeil 24">
+            <a:extLst>
+              <a:ext uri="{FF2B5EF4-FFF2-40B4-BE49-F238E27FC236}">
+                <a16:creationId xmlns:a16="http://schemas.microsoft.com/office/drawing/2014/main" id="{2BFBB725-0DD1-4CDB-A9D1-8FA93D047573}"/>
+              </a:ext>
+            </a:extLst>
+          </p:cNvPr>
+          <p:cNvCxnSpPr/>
+          <p:nvPr/>
+        </p:nvCxnSpPr>
+        <p:spPr>
+          <a:xfrm flipH="1">
+            <a:off x="2667000" y="4569285"/>
+            <a:ext cx="1600200" cy="0"/>
+          </a:xfrm>
+          <a:prstGeom prst="straightConnector1">
+            <a:avLst/>
+          </a:prstGeom>
+          <a:ln w="57150">
+            <a:solidFill>
+              <a:schemeClr val="tx1"/>
+            </a:solidFill>
+            <a:tailEnd type="triangle"/>
+          </a:ln>
+        </p:spPr>
+        <p:style>
+          <a:lnRef idx="1">
+            <a:schemeClr val="accent1"/>
+          </a:lnRef>
+          <a:fillRef idx="0">
+            <a:schemeClr val="accent1"/>
+          </a:fillRef>
+          <a:effectRef idx="0">
+            <a:schemeClr val="accent1"/>
+          </a:effectRef>
+          <a:fontRef idx="minor">
+            <a:schemeClr val="tx1"/>
+          </a:fontRef>
+        </p:style>
+      </p:cxnSp>
+      <p:sp>
+        <p:nvSpPr>
+          <p:cNvPr id="26" name="Textfeld 25">
+            <a:extLst>
+              <a:ext uri="{FF2B5EF4-FFF2-40B4-BE49-F238E27FC236}">
+                <a16:creationId xmlns:a16="http://schemas.microsoft.com/office/drawing/2014/main" id="{164572A9-00B9-492D-BCB0-CF0B605BDA1E}"/>
+              </a:ext>
+            </a:extLst>
+          </p:cNvPr>
+          <p:cNvSpPr txBox="1"/>
+          <p:nvPr/>
+        </p:nvSpPr>
+        <p:spPr>
+          <a:xfrm>
+            <a:off x="2810591" y="4246119"/>
+            <a:ext cx="1245996" cy="646331"/>
+          </a:xfrm>
+          <a:prstGeom prst="rect">
+            <a:avLst/>
+          </a:prstGeom>
+          <a:noFill/>
+        </p:spPr>
+        <p:txBody>
+          <a:bodyPr wrap="square" rtlCol="0">
+            <a:spAutoFit/>
+          </a:bodyPr>
+          <a:lstStyle/>
+          <a:p>
+            <a:r>
+              <a:rPr lang="de-DE" dirty="0"/>
+              <a:t>Liste von Kandidaten</a:t>
+            </a:r>
+          </a:p>
+        </p:txBody>
+      </p:sp>
+    </p:spTree>
+    <p:extLst>
+      <p:ext uri="{BB962C8B-B14F-4D97-AF65-F5344CB8AC3E}">
+        <p14:creationId xmlns:p14="http://schemas.microsoft.com/office/powerpoint/2010/main" val="2146479671"/>
       </p:ext>
     </p:extLst>
   </p:cSld>

</xml_diff>

<commit_message>
Fragen für das Interview und Vergleich der pptx ergänzt
</commit_message>
<xml_diff>
--- a/8vance.pptx
+++ b/8vance.pptx
@@ -277,7 +277,7 @@
           <a:p>
             <a:fld id="{F60B625B-07BC-4D1D-8392-43F677406593}" type="datetimeFigureOut">
               <a:rPr lang="de-DE" smtClean="0"/>
-              <a:t>27.10.2017</a:t>
+              <a:t>02.11.2017</a:t>
             </a:fld>
             <a:endParaRPr lang="de-DE"/>
           </a:p>
@@ -475,7 +475,7 @@
           <a:p>
             <a:fld id="{F60B625B-07BC-4D1D-8392-43F677406593}" type="datetimeFigureOut">
               <a:rPr lang="de-DE" smtClean="0"/>
-              <a:t>27.10.2017</a:t>
+              <a:t>02.11.2017</a:t>
             </a:fld>
             <a:endParaRPr lang="de-DE"/>
           </a:p>
@@ -683,7 +683,7 @@
           <a:p>
             <a:fld id="{F60B625B-07BC-4D1D-8392-43F677406593}" type="datetimeFigureOut">
               <a:rPr lang="de-DE" smtClean="0"/>
-              <a:t>27.10.2017</a:t>
+              <a:t>02.11.2017</a:t>
             </a:fld>
             <a:endParaRPr lang="de-DE"/>
           </a:p>
@@ -881,7 +881,7 @@
           <a:p>
             <a:fld id="{F60B625B-07BC-4D1D-8392-43F677406593}" type="datetimeFigureOut">
               <a:rPr lang="de-DE" smtClean="0"/>
-              <a:t>27.10.2017</a:t>
+              <a:t>02.11.2017</a:t>
             </a:fld>
             <a:endParaRPr lang="de-DE"/>
           </a:p>
@@ -1156,7 +1156,7 @@
           <a:p>
             <a:fld id="{F60B625B-07BC-4D1D-8392-43F677406593}" type="datetimeFigureOut">
               <a:rPr lang="de-DE" smtClean="0"/>
-              <a:t>27.10.2017</a:t>
+              <a:t>02.11.2017</a:t>
             </a:fld>
             <a:endParaRPr lang="de-DE"/>
           </a:p>
@@ -1421,7 +1421,7 @@
           <a:p>
             <a:fld id="{F60B625B-07BC-4D1D-8392-43F677406593}" type="datetimeFigureOut">
               <a:rPr lang="de-DE" smtClean="0"/>
-              <a:t>27.10.2017</a:t>
+              <a:t>02.11.2017</a:t>
             </a:fld>
             <a:endParaRPr lang="de-DE"/>
           </a:p>
@@ -1833,7 +1833,7 @@
           <a:p>
             <a:fld id="{F60B625B-07BC-4D1D-8392-43F677406593}" type="datetimeFigureOut">
               <a:rPr lang="de-DE" smtClean="0"/>
-              <a:t>27.10.2017</a:t>
+              <a:t>02.11.2017</a:t>
             </a:fld>
             <a:endParaRPr lang="de-DE"/>
           </a:p>
@@ -1974,7 +1974,7 @@
           <a:p>
             <a:fld id="{F60B625B-07BC-4D1D-8392-43F677406593}" type="datetimeFigureOut">
               <a:rPr lang="de-DE" smtClean="0"/>
-              <a:t>27.10.2017</a:t>
+              <a:t>02.11.2017</a:t>
             </a:fld>
             <a:endParaRPr lang="de-DE"/>
           </a:p>
@@ -2087,7 +2087,7 @@
           <a:p>
             <a:fld id="{F60B625B-07BC-4D1D-8392-43F677406593}" type="datetimeFigureOut">
               <a:rPr lang="de-DE" smtClean="0"/>
-              <a:t>27.10.2017</a:t>
+              <a:t>02.11.2017</a:t>
             </a:fld>
             <a:endParaRPr lang="de-DE"/>
           </a:p>
@@ -2398,7 +2398,7 @@
           <a:p>
             <a:fld id="{F60B625B-07BC-4D1D-8392-43F677406593}" type="datetimeFigureOut">
               <a:rPr lang="de-DE" smtClean="0"/>
-              <a:t>27.10.2017</a:t>
+              <a:t>02.11.2017</a:t>
             </a:fld>
             <a:endParaRPr lang="de-DE"/>
           </a:p>
@@ -2686,7 +2686,7 @@
           <a:p>
             <a:fld id="{F60B625B-07BC-4D1D-8392-43F677406593}" type="datetimeFigureOut">
               <a:rPr lang="de-DE" smtClean="0"/>
-              <a:t>27.10.2017</a:t>
+              <a:t>02.11.2017</a:t>
             </a:fld>
             <a:endParaRPr lang="de-DE"/>
           </a:p>
@@ -2927,7 +2927,7 @@
           <a:p>
             <a:fld id="{F60B625B-07BC-4D1D-8392-43F677406593}" type="datetimeFigureOut">
               <a:rPr lang="de-DE" smtClean="0"/>
-              <a:t>27.10.2017</a:t>
+              <a:t>02.11.2017</a:t>
             </a:fld>
             <a:endParaRPr lang="de-DE"/>
           </a:p>
@@ -4563,6 +4563,31 @@
           <a:bodyPr/>
           <a:lstStyle/>
           <a:p>
+            <a:r>
+              <a:rPr lang="de-DE" dirty="0">
+                <a:latin typeface="Arial" panose="020B0604020202020204" pitchFamily="34" charset="0"/>
+                <a:cs typeface="Arial" panose="020B0604020202020204" pitchFamily="34" charset="0"/>
+              </a:rPr>
+              <a:t>Kosten</a:t>
+            </a:r>
+          </a:p>
+          <a:p>
+            <a:r>
+              <a:rPr lang="de-DE" dirty="0">
+                <a:latin typeface="Arial" panose="020B0604020202020204" pitchFamily="34" charset="0"/>
+                <a:cs typeface="Arial" panose="020B0604020202020204" pitchFamily="34" charset="0"/>
+              </a:rPr>
+              <a:t>Erfolg</a:t>
+            </a:r>
+          </a:p>
+          <a:p>
+            <a:r>
+              <a:rPr lang="de-DE">
+                <a:latin typeface="Arial" panose="020B0604020202020204" pitchFamily="34" charset="0"/>
+                <a:cs typeface="Arial" panose="020B0604020202020204" pitchFamily="34" charset="0"/>
+              </a:rPr>
+              <a:t>Zeitaufwand</a:t>
+            </a:r>
             <a:endParaRPr lang="de-DE" dirty="0">
               <a:latin typeface="Arial" panose="020B0604020202020204" pitchFamily="34" charset="0"/>
               <a:cs typeface="Arial" panose="020B0604020202020204" pitchFamily="34" charset="0"/>

</xml_diff>